<commit_message>
Add Misc tab and Start button.
</commit_message>
<xml_diff>
--- a/Art/Bombardier.pptx
+++ b/Art/Bombardier.pptx
@@ -7,6 +7,7 @@
   <p:sldIdLst>
     <p:sldId id="256" r:id="rId2"/>
     <p:sldId id="257" r:id="rId3"/>
+    <p:sldId id="258" r:id="rId4"/>
   </p:sldIdLst>
   <p:sldSz cx="9144000" cy="6858000" type="screen4x3"/>
   <p:notesSz cx="6858000" cy="9144000"/>
@@ -289,7 +290,7 @@
           <a:p>
             <a:fld id="{DFD7034F-1760-4B20-AE6D-A3DD230D8A49}" type="datetimeFigureOut">
               <a:rPr lang="ru-RU" smtClean="0"/>
-              <a:t>29.08.2013</a:t>
+              <a:t>04.09.2013</a:t>
             </a:fld>
             <a:endParaRPr lang="ru-RU"/>
           </a:p>
@@ -459,7 +460,7 @@
           <a:p>
             <a:fld id="{DFD7034F-1760-4B20-AE6D-A3DD230D8A49}" type="datetimeFigureOut">
               <a:rPr lang="ru-RU" smtClean="0"/>
-              <a:t>29.08.2013</a:t>
+              <a:t>04.09.2013</a:t>
             </a:fld>
             <a:endParaRPr lang="ru-RU"/>
           </a:p>
@@ -639,7 +640,7 @@
           <a:p>
             <a:fld id="{DFD7034F-1760-4B20-AE6D-A3DD230D8A49}" type="datetimeFigureOut">
               <a:rPr lang="ru-RU" smtClean="0"/>
-              <a:t>29.08.2013</a:t>
+              <a:t>04.09.2013</a:t>
             </a:fld>
             <a:endParaRPr lang="ru-RU"/>
           </a:p>
@@ -809,7 +810,7 @@
           <a:p>
             <a:fld id="{DFD7034F-1760-4B20-AE6D-A3DD230D8A49}" type="datetimeFigureOut">
               <a:rPr lang="ru-RU" smtClean="0"/>
-              <a:t>29.08.2013</a:t>
+              <a:t>04.09.2013</a:t>
             </a:fld>
             <a:endParaRPr lang="ru-RU"/>
           </a:p>
@@ -1055,7 +1056,7 @@
           <a:p>
             <a:fld id="{DFD7034F-1760-4B20-AE6D-A3DD230D8A49}" type="datetimeFigureOut">
               <a:rPr lang="ru-RU" smtClean="0"/>
-              <a:t>29.08.2013</a:t>
+              <a:t>04.09.2013</a:t>
             </a:fld>
             <a:endParaRPr lang="ru-RU"/>
           </a:p>
@@ -1343,7 +1344,7 @@
           <a:p>
             <a:fld id="{DFD7034F-1760-4B20-AE6D-A3DD230D8A49}" type="datetimeFigureOut">
               <a:rPr lang="ru-RU" smtClean="0"/>
-              <a:t>29.08.2013</a:t>
+              <a:t>04.09.2013</a:t>
             </a:fld>
             <a:endParaRPr lang="ru-RU"/>
           </a:p>
@@ -1765,7 +1766,7 @@
           <a:p>
             <a:fld id="{DFD7034F-1760-4B20-AE6D-A3DD230D8A49}" type="datetimeFigureOut">
               <a:rPr lang="ru-RU" smtClean="0"/>
-              <a:t>29.08.2013</a:t>
+              <a:t>04.09.2013</a:t>
             </a:fld>
             <a:endParaRPr lang="ru-RU"/>
           </a:p>
@@ -1883,7 +1884,7 @@
           <a:p>
             <a:fld id="{DFD7034F-1760-4B20-AE6D-A3DD230D8A49}" type="datetimeFigureOut">
               <a:rPr lang="ru-RU" smtClean="0"/>
-              <a:t>29.08.2013</a:t>
+              <a:t>04.09.2013</a:t>
             </a:fld>
             <a:endParaRPr lang="ru-RU"/>
           </a:p>
@@ -1978,7 +1979,7 @@
           <a:p>
             <a:fld id="{DFD7034F-1760-4B20-AE6D-A3DD230D8A49}" type="datetimeFigureOut">
               <a:rPr lang="ru-RU" smtClean="0"/>
-              <a:t>29.08.2013</a:t>
+              <a:t>04.09.2013</a:t>
             </a:fld>
             <a:endParaRPr lang="ru-RU"/>
           </a:p>
@@ -2255,7 +2256,7 @@
           <a:p>
             <a:fld id="{DFD7034F-1760-4B20-AE6D-A3DD230D8A49}" type="datetimeFigureOut">
               <a:rPr lang="ru-RU" smtClean="0"/>
-              <a:t>29.08.2013</a:t>
+              <a:t>04.09.2013</a:t>
             </a:fld>
             <a:endParaRPr lang="ru-RU"/>
           </a:p>
@@ -2508,7 +2509,7 @@
           <a:p>
             <a:fld id="{DFD7034F-1760-4B20-AE6D-A3DD230D8A49}" type="datetimeFigureOut">
               <a:rPr lang="ru-RU" smtClean="0"/>
-              <a:t>29.08.2013</a:t>
+              <a:t>04.09.2013</a:t>
             </a:fld>
             <a:endParaRPr lang="ru-RU"/>
           </a:p>
@@ -2721,7 +2722,7 @@
           <a:p>
             <a:fld id="{DFD7034F-1760-4B20-AE6D-A3DD230D8A49}" type="datetimeFigureOut">
               <a:rPr lang="ru-RU" smtClean="0"/>
-              <a:t>29.08.2013</a:t>
+              <a:t>04.09.2013</a:t>
             </a:fld>
             <a:endParaRPr lang="ru-RU"/>
           </a:p>
@@ -4922,6 +4923,97 @@
 </p:sld>
 </file>
 
+<file path=ppt/slides/slide3.xml><?xml version="1.0" encoding="utf-8"?>
+<p:sld xmlns:a="http://schemas.openxmlformats.org/drawingml/2006/main" xmlns:r="http://schemas.openxmlformats.org/officeDocument/2006/relationships" xmlns:p="http://schemas.openxmlformats.org/presentationml/2006/main">
+  <p:cSld>
+    <p:spTree>
+      <p:nvGrpSpPr>
+        <p:cNvPr id="1" name=""/>
+        <p:cNvGrpSpPr/>
+        <p:nvPr/>
+      </p:nvGrpSpPr>
+      <p:grpSpPr>
+        <a:xfrm>
+          <a:off x="0" y="0"/>
+          <a:ext cx="0" cy="0"/>
+          <a:chOff x="0" y="0"/>
+          <a:chExt cx="0" cy="0"/>
+        </a:xfrm>
+      </p:grpSpPr>
+      <p:sp>
+        <p:nvSpPr>
+          <p:cNvPr id="2" name="Rectangle 1"/>
+          <p:cNvSpPr/>
+          <p:nvPr/>
+        </p:nvSpPr>
+        <p:spPr>
+          <a:xfrm>
+            <a:off x="1066800" y="1524000"/>
+            <a:ext cx="2286000" cy="2286000"/>
+          </a:xfrm>
+          <a:prstGeom prst="rect">
+            <a:avLst/>
+          </a:prstGeom>
+          <a:solidFill>
+            <a:schemeClr val="tx1"/>
+          </a:solidFill>
+          <a:ln w="127000">
+            <a:solidFill>
+              <a:srgbClr val="00B050"/>
+            </a:solidFill>
+            <a:miter lim="800000"/>
+          </a:ln>
+        </p:spPr>
+        <p:style>
+          <a:lnRef idx="2">
+            <a:schemeClr val="accent1">
+              <a:shade val="50000"/>
+            </a:schemeClr>
+          </a:lnRef>
+          <a:fillRef idx="1">
+            <a:schemeClr val="accent1"/>
+          </a:fillRef>
+          <a:effectRef idx="0">
+            <a:schemeClr val="accent1"/>
+          </a:effectRef>
+          <a:fontRef idx="minor">
+            <a:schemeClr val="lt1"/>
+          </a:fontRef>
+        </p:style>
+        <p:txBody>
+          <a:bodyPr rtlCol="0" anchor="ctr"/>
+          <a:lstStyle/>
+          <a:p>
+            <a:pPr algn="ctr"/>
+            <a:r>
+              <a:rPr lang="en-US" sz="6600" dirty="0" smtClean="0">
+                <a:solidFill>
+                  <a:srgbClr val="00B050"/>
+                </a:solidFill>
+              </a:rPr>
+              <a:t>START</a:t>
+            </a:r>
+            <a:endParaRPr lang="en-US" sz="6600" dirty="0">
+              <a:solidFill>
+                <a:srgbClr val="00B050"/>
+              </a:solidFill>
+            </a:endParaRPr>
+          </a:p>
+        </p:txBody>
+      </p:sp>
+    </p:spTree>
+    <p:extLst>
+      <p:ext uri="{BB962C8B-B14F-4D97-AF65-F5344CB8AC3E}">
+        <p14:creationId xmlns:p14="http://schemas.microsoft.com/office/powerpoint/2010/main" val="2630008603"/>
+      </p:ext>
+    </p:extLst>
+  </p:cSld>
+  <p:clrMapOvr>
+    <a:masterClrMapping/>
+  </p:clrMapOvr>
+</p:sld>
+</file>
+
 <file path=ppt/theme/theme1.xml><?xml version="1.0" encoding="utf-8"?>
 <a:theme xmlns:a="http://schemas.openxmlformats.org/drawingml/2006/main" name="Office Theme">
   <a:themeElements>

</xml_diff>

<commit_message>
Introduced Fireball class and sprite.
</commit_message>
<xml_diff>
--- a/Art/Bombardier.pptx
+++ b/Art/Bombardier.pptx
@@ -9,6 +9,7 @@
     <p:sldId id="257" r:id="rId3"/>
     <p:sldId id="258" r:id="rId4"/>
     <p:sldId id="259" r:id="rId5"/>
+    <p:sldId id="260" r:id="rId6"/>
   </p:sldIdLst>
   <p:sldSz cx="9144000" cy="6858000" type="screen4x3"/>
   <p:notesSz cx="6858000" cy="9144000"/>
@@ -291,7 +292,7 @@
           <a:p>
             <a:fld id="{DFD7034F-1760-4B20-AE6D-A3DD230D8A49}" type="datetimeFigureOut">
               <a:rPr lang="ru-RU" smtClean="0"/>
-              <a:t>08.09.2013</a:t>
+              <a:t>13.09.2013</a:t>
             </a:fld>
             <a:endParaRPr lang="ru-RU"/>
           </a:p>
@@ -461,7 +462,7 @@
           <a:p>
             <a:fld id="{DFD7034F-1760-4B20-AE6D-A3DD230D8A49}" type="datetimeFigureOut">
               <a:rPr lang="ru-RU" smtClean="0"/>
-              <a:t>08.09.2013</a:t>
+              <a:t>13.09.2013</a:t>
             </a:fld>
             <a:endParaRPr lang="ru-RU"/>
           </a:p>
@@ -641,7 +642,7 @@
           <a:p>
             <a:fld id="{DFD7034F-1760-4B20-AE6D-A3DD230D8A49}" type="datetimeFigureOut">
               <a:rPr lang="ru-RU" smtClean="0"/>
-              <a:t>08.09.2013</a:t>
+              <a:t>13.09.2013</a:t>
             </a:fld>
             <a:endParaRPr lang="ru-RU"/>
           </a:p>
@@ -811,7 +812,7 @@
           <a:p>
             <a:fld id="{DFD7034F-1760-4B20-AE6D-A3DD230D8A49}" type="datetimeFigureOut">
               <a:rPr lang="ru-RU" smtClean="0"/>
-              <a:t>08.09.2013</a:t>
+              <a:t>13.09.2013</a:t>
             </a:fld>
             <a:endParaRPr lang="ru-RU"/>
           </a:p>
@@ -1057,7 +1058,7 @@
           <a:p>
             <a:fld id="{DFD7034F-1760-4B20-AE6D-A3DD230D8A49}" type="datetimeFigureOut">
               <a:rPr lang="ru-RU" smtClean="0"/>
-              <a:t>08.09.2013</a:t>
+              <a:t>13.09.2013</a:t>
             </a:fld>
             <a:endParaRPr lang="ru-RU"/>
           </a:p>
@@ -1345,7 +1346,7 @@
           <a:p>
             <a:fld id="{DFD7034F-1760-4B20-AE6D-A3DD230D8A49}" type="datetimeFigureOut">
               <a:rPr lang="ru-RU" smtClean="0"/>
-              <a:t>08.09.2013</a:t>
+              <a:t>13.09.2013</a:t>
             </a:fld>
             <a:endParaRPr lang="ru-RU"/>
           </a:p>
@@ -1767,7 +1768,7 @@
           <a:p>
             <a:fld id="{DFD7034F-1760-4B20-AE6D-A3DD230D8A49}" type="datetimeFigureOut">
               <a:rPr lang="ru-RU" smtClean="0"/>
-              <a:t>08.09.2013</a:t>
+              <a:t>13.09.2013</a:t>
             </a:fld>
             <a:endParaRPr lang="ru-RU"/>
           </a:p>
@@ -1885,7 +1886,7 @@
           <a:p>
             <a:fld id="{DFD7034F-1760-4B20-AE6D-A3DD230D8A49}" type="datetimeFigureOut">
               <a:rPr lang="ru-RU" smtClean="0"/>
-              <a:t>08.09.2013</a:t>
+              <a:t>13.09.2013</a:t>
             </a:fld>
             <a:endParaRPr lang="ru-RU"/>
           </a:p>
@@ -1980,7 +1981,7 @@
           <a:p>
             <a:fld id="{DFD7034F-1760-4B20-AE6D-A3DD230D8A49}" type="datetimeFigureOut">
               <a:rPr lang="ru-RU" smtClean="0"/>
-              <a:t>08.09.2013</a:t>
+              <a:t>13.09.2013</a:t>
             </a:fld>
             <a:endParaRPr lang="ru-RU"/>
           </a:p>
@@ -2257,7 +2258,7 @@
           <a:p>
             <a:fld id="{DFD7034F-1760-4B20-AE6D-A3DD230D8A49}" type="datetimeFigureOut">
               <a:rPr lang="ru-RU" smtClean="0"/>
-              <a:t>08.09.2013</a:t>
+              <a:t>13.09.2013</a:t>
             </a:fld>
             <a:endParaRPr lang="ru-RU"/>
           </a:p>
@@ -2510,7 +2511,7 @@
           <a:p>
             <a:fld id="{DFD7034F-1760-4B20-AE6D-A3DD230D8A49}" type="datetimeFigureOut">
               <a:rPr lang="ru-RU" smtClean="0"/>
-              <a:t>08.09.2013</a:t>
+              <a:t>13.09.2013</a:t>
             </a:fld>
             <a:endParaRPr lang="ru-RU"/>
           </a:p>
@@ -2723,7 +2724,7 @@
           <a:p>
             <a:fld id="{DFD7034F-1760-4B20-AE6D-A3DD230D8A49}" type="datetimeFigureOut">
               <a:rPr lang="ru-RU" smtClean="0"/>
-              <a:t>08.09.2013</a:t>
+              <a:t>13.09.2013</a:t>
             </a:fld>
             <a:endParaRPr lang="ru-RU"/>
           </a:p>
@@ -5156,6 +5157,99 @@
 </p:sld>
 </file>
 
+<file path=ppt/slides/slide5.xml><?xml version="1.0" encoding="utf-8"?>
+<p:sld xmlns:a="http://schemas.openxmlformats.org/drawingml/2006/main" xmlns:r="http://schemas.openxmlformats.org/officeDocument/2006/relationships" xmlns:p="http://schemas.openxmlformats.org/presentationml/2006/main">
+  <p:cSld>
+    <p:spTree>
+      <p:nvGrpSpPr>
+        <p:cNvPr id="1" name=""/>
+        <p:cNvGrpSpPr/>
+        <p:nvPr/>
+      </p:nvGrpSpPr>
+      <p:grpSpPr>
+        <a:xfrm>
+          <a:off x="0" y="0"/>
+          <a:ext cx="0" cy="0"/>
+          <a:chOff x="0" y="0"/>
+          <a:chExt cx="0" cy="0"/>
+        </a:xfrm>
+      </p:grpSpPr>
+      <p:sp>
+        <p:nvSpPr>
+          <p:cNvPr id="2" name="Oval 1"/>
+          <p:cNvSpPr/>
+          <p:nvPr/>
+        </p:nvSpPr>
+        <p:spPr>
+          <a:xfrm>
+            <a:off x="1371600" y="1828800"/>
+            <a:ext cx="990600" cy="990600"/>
+          </a:xfrm>
+          <a:prstGeom prst="ellipse">
+            <a:avLst/>
+          </a:prstGeom>
+          <a:gradFill flip="none" rotWithShape="1">
+            <a:gsLst>
+              <a:gs pos="0">
+                <a:srgbClr val="FFF200"/>
+              </a:gs>
+              <a:gs pos="45000">
+                <a:srgbClr val="FF7A00"/>
+              </a:gs>
+              <a:gs pos="70000">
+                <a:srgbClr val="FF0300"/>
+              </a:gs>
+              <a:gs pos="100000">
+                <a:srgbClr val="4D0808"/>
+              </a:gs>
+            </a:gsLst>
+            <a:path path="circle">
+              <a:fillToRect l="50000" t="50000" r="50000" b="50000"/>
+            </a:path>
+            <a:tileRect/>
+          </a:gradFill>
+          <a:ln>
+            <a:noFill/>
+          </a:ln>
+        </p:spPr>
+        <p:style>
+          <a:lnRef idx="2">
+            <a:schemeClr val="accent1">
+              <a:shade val="50000"/>
+            </a:schemeClr>
+          </a:lnRef>
+          <a:fillRef idx="1">
+            <a:schemeClr val="accent1"/>
+          </a:fillRef>
+          <a:effectRef idx="0">
+            <a:schemeClr val="accent1"/>
+          </a:effectRef>
+          <a:fontRef idx="minor">
+            <a:schemeClr val="lt1"/>
+          </a:fontRef>
+        </p:style>
+        <p:txBody>
+          <a:bodyPr rtlCol="0" anchor="ctr"/>
+          <a:lstStyle/>
+          <a:p>
+            <a:pPr algn="ctr"/>
+            <a:endParaRPr lang="en-US"/>
+          </a:p>
+        </p:txBody>
+      </p:sp>
+    </p:spTree>
+    <p:extLst>
+      <p:ext uri="{BB962C8B-B14F-4D97-AF65-F5344CB8AC3E}">
+        <p14:creationId xmlns:p14="http://schemas.microsoft.com/office/powerpoint/2010/main" val="125585455"/>
+      </p:ext>
+    </p:extLst>
+  </p:cSld>
+  <p:clrMapOvr>
+    <a:masterClrMapping/>
+  </p:clrMapOvr>
+</p:sld>
+</file>
+
 <file path=ppt/theme/theme1.xml><?xml version="1.0" encoding="utf-8"?>
 <a:theme xmlns:a="http://schemas.openxmlformats.org/drawingml/2006/main" name="Office Theme">
   <a:themeElements>

</xml_diff>

<commit_message>
Added Door object to editor.
</commit_message>
<xml_diff>
--- a/Art/Bombardier.pptx
+++ b/Art/Bombardier.pptx
@@ -10,6 +10,7 @@
     <p:sldId id="258" r:id="rId4"/>
     <p:sldId id="259" r:id="rId5"/>
     <p:sldId id="260" r:id="rId6"/>
+    <p:sldId id="261" r:id="rId7"/>
   </p:sldIdLst>
   <p:sldSz cx="9144000" cy="6858000" type="screen4x3"/>
   <p:notesSz cx="6858000" cy="9144000"/>
@@ -292,7 +293,7 @@
           <a:p>
             <a:fld id="{DFD7034F-1760-4B20-AE6D-A3DD230D8A49}" type="datetimeFigureOut">
               <a:rPr lang="ru-RU" smtClean="0"/>
-              <a:t>13.09.2013</a:t>
+              <a:t>18.09.2013</a:t>
             </a:fld>
             <a:endParaRPr lang="ru-RU"/>
           </a:p>
@@ -462,7 +463,7 @@
           <a:p>
             <a:fld id="{DFD7034F-1760-4B20-AE6D-A3DD230D8A49}" type="datetimeFigureOut">
               <a:rPr lang="ru-RU" smtClean="0"/>
-              <a:t>13.09.2013</a:t>
+              <a:t>18.09.2013</a:t>
             </a:fld>
             <a:endParaRPr lang="ru-RU"/>
           </a:p>
@@ -642,7 +643,7 @@
           <a:p>
             <a:fld id="{DFD7034F-1760-4B20-AE6D-A3DD230D8A49}" type="datetimeFigureOut">
               <a:rPr lang="ru-RU" smtClean="0"/>
-              <a:t>13.09.2013</a:t>
+              <a:t>18.09.2013</a:t>
             </a:fld>
             <a:endParaRPr lang="ru-RU"/>
           </a:p>
@@ -812,7 +813,7 @@
           <a:p>
             <a:fld id="{DFD7034F-1760-4B20-AE6D-A3DD230D8A49}" type="datetimeFigureOut">
               <a:rPr lang="ru-RU" smtClean="0"/>
-              <a:t>13.09.2013</a:t>
+              <a:t>18.09.2013</a:t>
             </a:fld>
             <a:endParaRPr lang="ru-RU"/>
           </a:p>
@@ -1058,7 +1059,7 @@
           <a:p>
             <a:fld id="{DFD7034F-1760-4B20-AE6D-A3DD230D8A49}" type="datetimeFigureOut">
               <a:rPr lang="ru-RU" smtClean="0"/>
-              <a:t>13.09.2013</a:t>
+              <a:t>18.09.2013</a:t>
             </a:fld>
             <a:endParaRPr lang="ru-RU"/>
           </a:p>
@@ -1346,7 +1347,7 @@
           <a:p>
             <a:fld id="{DFD7034F-1760-4B20-AE6D-A3DD230D8A49}" type="datetimeFigureOut">
               <a:rPr lang="ru-RU" smtClean="0"/>
-              <a:t>13.09.2013</a:t>
+              <a:t>18.09.2013</a:t>
             </a:fld>
             <a:endParaRPr lang="ru-RU"/>
           </a:p>
@@ -1768,7 +1769,7 @@
           <a:p>
             <a:fld id="{DFD7034F-1760-4B20-AE6D-A3DD230D8A49}" type="datetimeFigureOut">
               <a:rPr lang="ru-RU" smtClean="0"/>
-              <a:t>13.09.2013</a:t>
+              <a:t>18.09.2013</a:t>
             </a:fld>
             <a:endParaRPr lang="ru-RU"/>
           </a:p>
@@ -1886,7 +1887,7 @@
           <a:p>
             <a:fld id="{DFD7034F-1760-4B20-AE6D-A3DD230D8A49}" type="datetimeFigureOut">
               <a:rPr lang="ru-RU" smtClean="0"/>
-              <a:t>13.09.2013</a:t>
+              <a:t>18.09.2013</a:t>
             </a:fld>
             <a:endParaRPr lang="ru-RU"/>
           </a:p>
@@ -1981,7 +1982,7 @@
           <a:p>
             <a:fld id="{DFD7034F-1760-4B20-AE6D-A3DD230D8A49}" type="datetimeFigureOut">
               <a:rPr lang="ru-RU" smtClean="0"/>
-              <a:t>13.09.2013</a:t>
+              <a:t>18.09.2013</a:t>
             </a:fld>
             <a:endParaRPr lang="ru-RU"/>
           </a:p>
@@ -2258,7 +2259,7 @@
           <a:p>
             <a:fld id="{DFD7034F-1760-4B20-AE6D-A3DD230D8A49}" type="datetimeFigureOut">
               <a:rPr lang="ru-RU" smtClean="0"/>
-              <a:t>13.09.2013</a:t>
+              <a:t>18.09.2013</a:t>
             </a:fld>
             <a:endParaRPr lang="ru-RU"/>
           </a:p>
@@ -2511,7 +2512,7 @@
           <a:p>
             <a:fld id="{DFD7034F-1760-4B20-AE6D-A3DD230D8A49}" type="datetimeFigureOut">
               <a:rPr lang="ru-RU" smtClean="0"/>
-              <a:t>13.09.2013</a:t>
+              <a:t>18.09.2013</a:t>
             </a:fld>
             <a:endParaRPr lang="ru-RU"/>
           </a:p>
@@ -2724,7 +2725,7 @@
           <a:p>
             <a:fld id="{DFD7034F-1760-4B20-AE6D-A3DD230D8A49}" type="datetimeFigureOut">
               <a:rPr lang="ru-RU" smtClean="0"/>
-              <a:t>13.09.2013</a:t>
+              <a:t>18.09.2013</a:t>
             </a:fld>
             <a:endParaRPr lang="ru-RU"/>
           </a:p>
@@ -5250,6 +5251,90 @@
 </p:sld>
 </file>
 
+<file path=ppt/slides/slide6.xml><?xml version="1.0" encoding="utf-8"?>
+<p:sld xmlns:a="http://schemas.openxmlformats.org/drawingml/2006/main" xmlns:r="http://schemas.openxmlformats.org/officeDocument/2006/relationships" xmlns:p="http://schemas.openxmlformats.org/presentationml/2006/main">
+  <p:cSld>
+    <p:spTree>
+      <p:nvGrpSpPr>
+        <p:cNvPr id="1" name=""/>
+        <p:cNvGrpSpPr/>
+        <p:nvPr/>
+      </p:nvGrpSpPr>
+      <p:grpSpPr>
+        <a:xfrm>
+          <a:off x="0" y="0"/>
+          <a:ext cx="0" cy="0"/>
+          <a:chOff x="0" y="0"/>
+          <a:chExt cx="0" cy="0"/>
+        </a:xfrm>
+      </p:grpSpPr>
+      <p:sp>
+        <p:nvSpPr>
+          <p:cNvPr id="2" name="Rectangle 1"/>
+          <p:cNvSpPr/>
+          <p:nvPr/>
+        </p:nvSpPr>
+        <p:spPr>
+          <a:xfrm>
+            <a:off x="914400" y="533400"/>
+            <a:ext cx="304800" cy="1524000"/>
+          </a:xfrm>
+          <a:prstGeom prst="rect">
+            <a:avLst/>
+          </a:prstGeom>
+          <a:pattFill prst="wdUpDiag">
+            <a:fgClr>
+              <a:schemeClr val="tx1">
+                <a:lumMod val="75000"/>
+                <a:lumOff val="25000"/>
+              </a:schemeClr>
+            </a:fgClr>
+            <a:bgClr>
+              <a:srgbClr val="A24D06"/>
+            </a:bgClr>
+          </a:pattFill>
+          <a:ln>
+            <a:noFill/>
+          </a:ln>
+        </p:spPr>
+        <p:style>
+          <a:lnRef idx="2">
+            <a:schemeClr val="accent1">
+              <a:shade val="50000"/>
+            </a:schemeClr>
+          </a:lnRef>
+          <a:fillRef idx="1">
+            <a:schemeClr val="accent1"/>
+          </a:fillRef>
+          <a:effectRef idx="0">
+            <a:schemeClr val="accent1"/>
+          </a:effectRef>
+          <a:fontRef idx="minor">
+            <a:schemeClr val="lt1"/>
+          </a:fontRef>
+        </p:style>
+        <p:txBody>
+          <a:bodyPr rtlCol="0" anchor="ctr"/>
+          <a:lstStyle/>
+          <a:p>
+            <a:pPr algn="ctr"/>
+            <a:endParaRPr lang="en-US"/>
+          </a:p>
+        </p:txBody>
+      </p:sp>
+    </p:spTree>
+    <p:extLst>
+      <p:ext uri="{BB962C8B-B14F-4D97-AF65-F5344CB8AC3E}">
+        <p14:creationId xmlns:p14="http://schemas.microsoft.com/office/powerpoint/2010/main" val="1634936325"/>
+      </p:ext>
+    </p:extLst>
+  </p:cSld>
+  <p:clrMapOvr>
+    <a:masterClrMapping/>
+  </p:clrMapOvr>
+</p:sld>
+</file>
+
 <file path=ppt/theme/theme1.xml><?xml version="1.0" encoding="utf-8"?>
 <a:theme xmlns:a="http://schemas.openxmlformats.org/drawingml/2006/main" name="Office Theme">
   <a:themeElements>

</xml_diff>